<commit_message>
use the new md format
</commit_message>
<xml_diff>
--- a/mvccc_master_modern_dark.pptx
+++ b/mvccc_master_modern_dark.pptx
@@ -768,7 +768,7 @@
 </file>
 
 <file path=ppt/slideLayouts/slideLayout3.xml><?xml version="1.0" encoding="utf-8"?>
-<p:sldLayout xmlns:a="http://schemas.openxmlformats.org/drawingml/2006/main" xmlns:r="http://schemas.openxmlformats.org/officeDocument/2006/relationships" xmlns:p="http://schemas.openxmlformats.org/presentationml/2006/main" xmlns:m="http://schemas.openxmlformats.org/officeDocument/2006/math" xmlns:a14="http://schemas.microsoft.com/office/drawing/2010/main" type="tx" showMasterSp="1" showMasterPhAnim="1">
+<p:sldLayout xmlns:a="http://schemas.openxmlformats.org/drawingml/2006/main" xmlns:p="http://schemas.openxmlformats.org/presentationml/2006/main" type="tx" showMasterSp="1" showMasterPhAnim="1">
   <p:cSld name="verse">
     <p:spTree>
       <p:nvGrpSpPr>
@@ -799,7 +799,16 @@
         </p:spPr>
         <p:txBody>
           <a:bodyPr/>
-          <a:lstStyle/>
+          <a:lstStyle>
+            <a:lvl1pPr>
+              <a:defRPr sz="5200" b="1">
+                <a:latin typeface="Helvetica Neue"/>
+                <a:ea typeface="Helvetica Neue"/>
+                <a:cs typeface="Helvetica Neue"/>
+                <a:sym typeface="Helvetica Neue"/>
+              </a:defRPr>
+            </a:lvl1pPr>
+          </a:lstStyle>
           <a:p>
             <a:pPr/>
             <a:r>
@@ -823,7 +832,19 @@
         </p:spPr>
         <p:txBody>
           <a:bodyPr/>
-          <a:lstStyle/>
+          <a:lstStyle>
+            <a:lvl1pPr>
+              <a:defRPr sz="3800">
+                <a:latin typeface="Helvetica Neue"/>
+                <a:ea typeface="Helvetica Neue"/>
+                <a:cs typeface="Helvetica Neue"/>
+                <a:sym typeface="Helvetica Neue"/>
+              </a:defRPr>
+              <a:lnSpc>
+                <a:spcPct val="120000"/>
+              </a:lnSpc>
+            </a:lvl1pPr>
+          </a:lstStyle>
           <a:p>
             <a:pPr/>
             <a:r>
@@ -859,12 +880,12 @@
   <p:clrMapOvr>
     <a:masterClrMapping/>
   </p:clrMapOvr>
-  <p:transition xmlns:p14="http://schemas.microsoft.com/office/powerpoint/2010/main" spd="med" advClick="1"/>
+  <p:transition spd="med" advClick="1"/>
 </p:sldLayout>
 </file>
 
 <file path=ppt/slideLayouts/slideLayout4.xml><?xml version="1.0" encoding="utf-8"?>
-<p:sldLayout xmlns:a="http://schemas.openxmlformats.org/drawingml/2006/main" xmlns:r="http://schemas.openxmlformats.org/officeDocument/2006/relationships" xmlns:p="http://schemas.openxmlformats.org/presentationml/2006/main" xmlns:m="http://schemas.openxmlformats.org/officeDocument/2006/math" xmlns:a14="http://schemas.microsoft.com/office/drawing/2010/main" type="tx" showMasterSp="1" showMasterPhAnim="1">
+<p:sldLayout xmlns:a="http://schemas.openxmlformats.org/drawingml/2006/main" xmlns:p="http://schemas.openxmlformats.org/presentationml/2006/main" type="tx" showMasterSp="1" showMasterPhAnim="1">
   <p:cSld name="memorize">
     <p:spTree>
       <p:nvGrpSpPr>
@@ -897,7 +918,7 @@
           <a:bodyPr/>
           <a:lstStyle>
             <a:lvl1pPr>
-              <a:defRPr b="1" sz="6000">
+              <a:defRPr b="1" sz="7200">
                 <a:latin typeface="Helvetica Neue"/>
                 <a:ea typeface="Helvetica Neue"/>
                 <a:cs typeface="Helvetica Neue"/>
@@ -928,7 +949,19 @@
         </p:spPr>
         <p:txBody>
           <a:bodyPr/>
-          <a:lstStyle/>
+          <a:lstStyle>
+            <a:lvl1pPr>
+              <a:defRPr sz="3800">
+                <a:latin typeface="Helvetica Neue"/>
+                <a:ea typeface="Helvetica Neue"/>
+                <a:cs typeface="Helvetica Neue"/>
+                <a:sym typeface="Helvetica Neue"/>
+              </a:defRPr>
+              <a:lnSpc>
+                <a:spcPct val="120000"/>
+              </a:lnSpc>
+            </a:lvl1pPr>
+          </a:lstStyle>
           <a:p>
             <a:pPr/>
             <a:r>
@@ -964,12 +997,12 @@
   <p:clrMapOvr>
     <a:masterClrMapping/>
   </p:clrMapOvr>
-  <p:transition xmlns:p14="http://schemas.microsoft.com/office/powerpoint/2010/main" spd="med" advClick="1"/>
+  <p:transition spd="med" advClick="1"/>
 </p:sldLayout>
 </file>
 
 <file path=ppt/slideLayouts/slideLayout5.xml><?xml version="1.0" encoding="utf-8"?>
-<p:sldLayout xmlns:a="http://schemas.openxmlformats.org/drawingml/2006/main" xmlns:r="http://schemas.openxmlformats.org/officeDocument/2006/relationships" xmlns:p="http://schemas.openxmlformats.org/presentationml/2006/main" xmlns:m="http://schemas.openxmlformats.org/officeDocument/2006/math" xmlns:a14="http://schemas.microsoft.com/office/drawing/2010/main" type="tx" showMasterSp="1" showMasterPhAnim="1">
+<p:sldLayout xmlns:a="http://schemas.openxmlformats.org/drawingml/2006/main" xmlns:p="http://schemas.openxmlformats.org/presentationml/2006/main" type="tx" showMasterSp="1" showMasterPhAnim="1">
   <p:cSld name="teaching">
     <p:spTree>
       <p:nvGrpSpPr>
@@ -1002,7 +1035,7 @@
           <a:bodyPr/>
           <a:lstStyle>
             <a:lvl1pPr>
-              <a:defRPr b="1" sz="6000">
+              <a:defRPr b="1" sz="5600">
                 <a:latin typeface="Helvetica Neue"/>
                 <a:ea typeface="Helvetica Neue"/>
                 <a:cs typeface="Helvetica Neue"/>
@@ -1034,7 +1067,17 @@
         <p:txBody>
           <a:bodyPr/>
           <a:lstStyle>
-            <a:lvl1pPr algn="ctr"/>
+            <a:lvl1pPr algn="ctr">
+              <a:defRPr sz="3600">
+                <a:latin typeface="Helvetica Neue"/>
+                <a:ea typeface="Helvetica Neue"/>
+                <a:cs typeface="Helvetica Neue"/>
+                <a:sym typeface="Helvetica Neue"/>
+              </a:defRPr>
+              <a:lnSpc>
+                <a:spcPct val="120000"/>
+              </a:lnSpc>
+            </a:lvl1pPr>
           </a:lstStyle>
           <a:p>
             <a:pPr/>
@@ -1071,12 +1114,12 @@
   <p:clrMapOvr>
     <a:masterClrMapping/>
   </p:clrMapOvr>
-  <p:transition xmlns:p14="http://schemas.microsoft.com/office/powerpoint/2010/main" spd="med" advClick="1"/>
+  <p:transition spd="med" advClick="1"/>
 </p:sldLayout>
 </file>
 
 <file path=ppt/slideLayouts/slideLayout6.xml><?xml version="1.0" encoding="utf-8"?>
-<p:sldLayout xmlns:a="http://schemas.openxmlformats.org/drawingml/2006/main" xmlns:r="http://schemas.openxmlformats.org/officeDocument/2006/relationships" xmlns:p="http://schemas.openxmlformats.org/presentationml/2006/main" xmlns:m="http://schemas.openxmlformats.org/officeDocument/2006/math" xmlns:a14="http://schemas.microsoft.com/office/drawing/2010/main" type="tx" showMasterSp="1" showMasterPhAnim="1">
+<p:sldLayout xmlns:a="http://schemas.openxmlformats.org/drawingml/2006/main" xmlns:p="http://schemas.openxmlformats.org/presentationml/2006/main" type="tx" showMasterSp="1" showMasterPhAnim="1">
   <p:cSld name="section">
     <p:spTree>
       <p:nvGrpSpPr>
@@ -1113,7 +1156,7 @@
           <a:bodyPr/>
           <a:lstStyle>
             <a:lvl1pPr>
-              <a:defRPr b="1">
+              <a:defRPr b="1" sz="7200">
                 <a:latin typeface="Helvetica Neue"/>
                 <a:ea typeface="Helvetica Neue"/>
                 <a:cs typeface="Helvetica Neue"/>
@@ -1156,7 +1199,7 @@
   <p:clrMapOvr>
     <a:masterClrMapping/>
   </p:clrMapOvr>
-  <p:transition xmlns:p14="http://schemas.microsoft.com/office/powerpoint/2010/main" spd="med" advClick="1"/>
+  <p:transition spd="med" advClick="1"/>
 </p:sldLayout>
 </file>
 
@@ -1337,7 +1380,7 @@
 </file>
 
 <file path=ppt/slideMasters/slideMaster1.xml><?xml version="1.0" encoding="utf-8"?>
-<p:sldMaster xmlns:a="http://schemas.openxmlformats.org/drawingml/2006/main" xmlns:r="http://schemas.openxmlformats.org/officeDocument/2006/relationships" xmlns:p="http://schemas.openxmlformats.org/presentationml/2006/main" xmlns:m="http://schemas.openxmlformats.org/officeDocument/2006/math" xmlns:a14="http://schemas.microsoft.com/office/drawing/2010/main">
+<p:sldMaster xmlns:a="http://schemas.openxmlformats.org/drawingml/2006/main" xmlns:ns3="http://schemas.microsoft.com/office/mac/drawingml/2011/main" xmlns:p="http://schemas.openxmlformats.org/presentationml/2006/main" xmlns:r="http://schemas.openxmlformats.org/officeDocument/2006/relationships">
   <p:cSld>
     <p:bg>
       <p:bgPr>
@@ -3187,7 +3230,7 @@
           </a:ln>
           <a:extLst>
             <a:ext uri="{C572A759-6A51-4108-AA02-DFA0A04FC94B}">
-              <ma14:wrappingTextBoxFlag xmlns:ma14="http://schemas.microsoft.com/office/mac/drawingml/2011/main" val="1"/>
+              <ns3:wrappingTextBoxFlag val="1"/>
             </a:ext>
           </a:extLst>
         </p:spPr>
@@ -3225,7 +3268,7 @@
           </a:ln>
           <a:extLst>
             <a:ext uri="{C572A759-6A51-4108-AA02-DFA0A04FC94B}">
-              <ma14:wrappingTextBoxFlag xmlns:ma14="http://schemas.microsoft.com/office/mac/drawingml/2011/main" val="1"/>
+              <ns3:wrappingTextBoxFlag val="1"/>
             </a:ext>
           </a:extLst>
         </p:spPr>
@@ -3324,7 +3367,7 @@
     <p:sldLayoutId id="2147483657" r:id="rId11"/>
     <p:sldLayoutId id="2147483658" r:id="rId12"/>
   </p:sldLayoutIdLst>
-  <p:transition xmlns:p14="http://schemas.microsoft.com/office/powerpoint/2010/main" spd="med" advClick="1"/>
+  <p:transition spd="med" advClick="1"/>
   <p:txStyles>
     <p:titleStyle>
       <a:lvl1pPr marL="0" marR="0" indent="0" algn="ctr" defTabSz="914400" rtl="0" latinLnBrk="0">
@@ -3342,7 +3385,7 @@
         <a:buFontTx/>
         <a:buNone/>
         <a:tabLst/>
-        <a:defRPr b="0" baseline="0" cap="none" i="0" spc="0" strike="noStrike" sz="5400" u="none">
+        <a:defRPr b="0" baseline="0" cap="none" i="0" spc="0" strike="noStrike" sz="6400" u="none">
           <a:solidFill>
             <a:schemeClr val="accent6"/>
           </a:solidFill>
@@ -3352,10 +3395,10 @@
             </a:outerShdw>
           </a:effectLst>
           <a:uFillTx/>
-          <a:latin typeface="PingFang TC Semibold"/>
-          <a:ea typeface="PingFang TC Semibold"/>
-          <a:cs typeface="PingFang TC Semibold"/>
-          <a:sym typeface="PingFang TC Semibold"/>
+          <a:latin typeface="Helvetica Neue"/>
+          <a:ea typeface="Helvetica Neue"/>
+          <a:cs typeface="Helvetica Neue"/>
+          <a:sym typeface="Helvetica Neue"/>
         </a:defRPr>
       </a:lvl1pPr>
       <a:lvl2pPr marL="0" marR="0" indent="0" algn="ctr" defTabSz="914400" rtl="0" latinLnBrk="0">
@@ -3623,7 +3666,7 @@
         <a:buFontTx/>
         <a:buNone/>
         <a:tabLst/>
-        <a:defRPr b="0" baseline="0" cap="none" i="0" spc="0" strike="noStrike" sz="4800" u="none">
+        <a:defRPr b="0" baseline="0" cap="none" i="0" spc="0" strike="noStrike" sz="4000" u="none">
           <a:solidFill>
             <a:schemeClr val="accent6"/>
           </a:solidFill>

</xml_diff>

<commit_message>
Update teaching layout and slide content
</commit_message>
<xml_diff>
--- a/mvccc_master_modern_dark.pptx
+++ b/mvccc_master_modern_dark.pptx
@@ -1002,120 +1002,128 @@
 </file>
 
 <file path=ppt/slideLayouts/slideLayout5.xml><?xml version="1.0" encoding="utf-8"?>
-<p:sldLayout xmlns:a="http://schemas.openxmlformats.org/drawingml/2006/main" xmlns:p="http://schemas.openxmlformats.org/presentationml/2006/main" type="tx" showMasterSp="1" showMasterPhAnim="1">
-  <p:cSld name="teaching">
-    <p:spTree>
-      <p:nvGrpSpPr>
-        <p:cNvPr id="1" name=""/>
-        <p:cNvGrpSpPr/>
-        <p:nvPr/>
-      </p:nvGrpSpPr>
-      <p:grpSpPr>
-        <a:xfrm>
-          <a:off x="0" y="0"/>
-          <a:ext cx="0" cy="0"/>
-          <a:chOff x="0" y="0"/>
-          <a:chExt cx="0" cy="0"/>
-        </a:xfrm>
-      </p:grpSpPr>
-      <p:sp>
-        <p:nvSpPr>
-          <p:cNvPr id="55" name="信息"/>
-          <p:cNvSpPr txBox="1"/>
-          <p:nvPr>
-            <p:ph type="title" hasCustomPrompt="1"/>
-          </p:nvPr>
-        </p:nvSpPr>
-        <p:spPr>
-          <a:prstGeom prst="rect">
-            <a:avLst/>
-          </a:prstGeom>
-        </p:spPr>
-        <p:txBody>
-          <a:bodyPr/>
-          <a:lstStyle>
-            <a:lvl1pPr>
-              <a:defRPr b="1" sz="5600">
-                <a:latin typeface="Helvetica Neue"/>
-                <a:ea typeface="Helvetica Neue"/>
-                <a:cs typeface="Helvetica Neue"/>
-                <a:sym typeface="Helvetica Neue"/>
-              </a:defRPr>
-            </a:lvl1pPr>
-          </a:lstStyle>
-          <a:p>
-            <a:pPr/>
-            <a:r>
-              <a:t>信息</a:t>
-            </a:r>
-          </a:p>
-        </p:txBody>
-      </p:sp>
-      <p:sp>
-        <p:nvSpPr>
-          <p:cNvPr id="56" name="Body Level One…"/>
-          <p:cNvSpPr txBox="1"/>
-          <p:nvPr>
-            <p:ph type="body" idx="21" hasCustomPrompt="1"/>
-          </p:nvPr>
-        </p:nvSpPr>
-        <p:spPr>
-          <a:prstGeom prst="rect">
-            <a:avLst/>
-          </a:prstGeom>
-        </p:spPr>
-        <p:txBody>
-          <a:bodyPr/>
-          <a:lstStyle>
-            <a:lvl1pPr algn="ctr">
-              <a:defRPr sz="3600">
-                <a:latin typeface="Helvetica Neue"/>
-                <a:ea typeface="Helvetica Neue"/>
-                <a:cs typeface="Helvetica Neue"/>
-                <a:sym typeface="Helvetica Neue"/>
-              </a:defRPr>
-              <a:lnSpc>
-                <a:spcPct val="120000"/>
-              </a:lnSpc>
-            </a:lvl1pPr>
-          </a:lstStyle>
-          <a:p>
-            <a:pPr/>
-            <a:r>
-              <a:t>神愛世人</a:t>
-            </a:r>
-          </a:p>
-        </p:txBody>
-      </p:sp>
-      <p:sp>
-        <p:nvSpPr>
-          <p:cNvPr id="57" name="Slide Number"/>
-          <p:cNvSpPr txBox="1"/>
-          <p:nvPr>
-            <p:ph type="sldNum" sz="quarter" idx="2"/>
-          </p:nvPr>
-        </p:nvSpPr>
-        <p:spPr>
-          <a:prstGeom prst="rect">
-            <a:avLst/>
-          </a:prstGeom>
-        </p:spPr>
-        <p:txBody>
-          <a:bodyPr/>
-          <a:lstStyle/>
-          <a:p>
-            <a:pPr/>
-            <a:fld id="{86CB4B4D-7CA3-9044-876B-883B54F8677D}" type="slidenum"/>
-          </a:p>
-        </p:txBody>
-      </p:sp>
-    </p:spTree>
-  </p:cSld>
-  <p:clrMapOvr>
-    <a:masterClrMapping/>
-  </p:clrMapOvr>
-  <p:transition spd="med" advClick="1"/>
-</p:sldLayout>
+<ns0:sldLayout xmlns:ns0="http://schemas.openxmlformats.org/presentationml/2006/main" xmlns:ns1="http://schemas.openxmlformats.org/drawingml/2006/main" type="tx" showMasterSp="1" showMasterPhAnim="1">
+  <ns0:cSld name="teaching">
+    <ns0:spTree>
+      <ns0:nvGrpSpPr>
+        <ns0:cNvPr id="1" name=""/>
+        <ns0:cNvGrpSpPr/>
+        <ns0:nvPr/>
+      </ns0:nvGrpSpPr>
+      <ns0:grpSpPr>
+        <ns1:xfrm>
+          <ns1:off x="0" y="0"/>
+          <ns1:ext cx="0" cy="0"/>
+          <ns1:chOff x="0" y="0"/>
+          <ns1:chExt cx="0" cy="0"/>
+        </ns1:xfrm>
+      </ns0:grpSpPr>
+      <ns0:sp>
+        <ns0:nvSpPr>
+          <ns0:cNvPr id="55" name="信息"/>
+          <ns0:cNvSpPr txBox="1"/>
+          <ns0:nvPr>
+            <ns0:ph type="title" hasCustomPrompt="1"/>
+          </ns0:nvPr>
+        </ns0:nvSpPr>
+        <ns0:spPr>
+          <ns1:prstGeom prst="rect">
+            <ns1:avLst/>
+          </ns1:prstGeom>
+          <ns1:xfrm>
+            <ns1:off x="548640" y="2377440"/>
+            <ns1:ext cx="11094720" cy="1097280"/>
+          </ns1:xfrm>
+        </ns0:spPr>
+        <ns0:txBody>
+          <ns1:bodyPr/>
+          <ns1:lstStyle>
+            <ns1:lvl1pPr>
+              <ns1:defRPr b="1" sz="5200">
+                <ns1:latin typeface="Helvetica Neue"/>
+                <ns1:ea typeface="Helvetica Neue"/>
+                <ns1:cs typeface="Helvetica Neue"/>
+                <ns1:sym typeface="Helvetica Neue"/>
+              </ns1:defRPr>
+            </ns1:lvl1pPr>
+          </ns1:lstStyle>
+          <ns1:p>
+            <ns1:pPr/>
+            <ns1:r>
+              <ns1:t>信息</ns1:t>
+            </ns1:r>
+          </ns1:p>
+        </ns0:txBody>
+      </ns0:sp>
+      <ns0:sp>
+        <ns0:nvSpPr>
+          <ns0:cNvPr id="56" name="Body Level One…"/>
+          <ns0:cNvSpPr txBox="1"/>
+          <ns0:nvPr>
+            <ns0:ph type="body" idx="21" hasCustomPrompt="1"/>
+          </ns0:nvPr>
+        </ns0:nvSpPr>
+        <ns0:spPr>
+          <ns1:prstGeom prst="rect">
+            <ns1:avLst/>
+          </ns1:prstGeom>
+          <ns1:xfrm>
+            <ns1:off x="548640" y="4023360"/>
+            <ns1:ext cx="11094720" cy="822960"/>
+          </ns1:xfrm>
+        </ns0:spPr>
+        <ns0:txBody>
+          <ns1:bodyPr/>
+          <ns1:lstStyle>
+            <ns1:lvl1pPr algn="ctr">
+              <ns1:defRPr sz="4000">
+                <ns1:latin typeface="Helvetica Neue"/>
+                <ns1:ea typeface="Helvetica Neue"/>
+                <ns1:cs typeface="Helvetica Neue"/>
+                <ns1:sym typeface="Helvetica Neue"/>
+              </ns1:defRPr>
+              <ns1:lnSpc>
+                <ns1:spcPct val="120000"/>
+              </ns1:lnSpc>
+            </ns1:lvl1pPr>
+          </ns1:lstStyle>
+          <ns1:p>
+            <ns1:pPr/>
+            <ns1:r>
+              <ns1:t>神愛世人</ns1:t>
+            </ns1:r>
+          </ns1:p>
+        </ns0:txBody>
+      </ns0:sp>
+      <ns0:sp>
+        <ns0:nvSpPr>
+          <ns0:cNvPr id="57" name="Slide Number"/>
+          <ns0:cNvSpPr txBox="1"/>
+          <ns0:nvPr>
+            <ns0:ph type="sldNum" sz="quarter" idx="2"/>
+          </ns0:nvPr>
+        </ns0:nvSpPr>
+        <ns0:spPr>
+          <ns1:prstGeom prst="rect">
+            <ns1:avLst/>
+          </ns1:prstGeom>
+        </ns0:spPr>
+        <ns0:txBody>
+          <ns1:bodyPr/>
+          <ns1:lstStyle/>
+          <ns1:p>
+            <ns1:pPr/>
+            <ns1:fld id="{86CB4B4D-7CA3-9044-876B-883B54F8677D}" type="slidenum"/>
+          </ns1:p>
+        </ns0:txBody>
+      </ns0:sp>
+    </ns0:spTree>
+  </ns0:cSld>
+  <ns0:clrMapOvr>
+    <ns1:masterClrMapping/>
+  </ns0:clrMapOvr>
+  <ns0:transition spd="med" advClick="1"/>
+</ns0:sldLayout>
 </file>
 
 <file path=ppt/slideLayouts/slideLayout6.xml><?xml version="1.0" encoding="utf-8"?>

</xml_diff>

<commit_message>
Add hymn number display and improve title slide formatting
- Display hymn numbers as '教會聖詩 #XXX' above hymn title in guillemets
- Apply 40pt font for hymn number line, 80pt bold for title line
- Apply 80pt bold for hymns without numbers for consistency
- Fix type annotations to resolve LSP errors (use Pptx type alias)
- Fix potential unbound variable in Scripture.add_to()
</commit_message>
<xml_diff>
--- a/mvccc_master_modern_dark.pptx
+++ b/mvccc_master_modern_dark.pptx
@@ -1334,8 +1334,8 @@
         </p:nvSpPr>
         <p:spPr>
           <a:xfrm>
-            <a:off x="1158086" y="2743200"/>
-            <a:ext cx="9875521" cy="1371600"/>
+            <a:off x="1158086" y="1800000"/>
+            <a:ext cx="9875521" cy="3200000"/>
           </a:xfrm>
           <a:prstGeom prst="rect">
             <a:avLst/>
@@ -1343,7 +1343,24 @@
         </p:spPr>
         <p:txBody>
           <a:bodyPr/>
-          <a:lstStyle/>
+          <a:lstStyle>
+            <a:lvl1pPr>
+              <a:defRPr sz="4000">
+                <a:latin typeface="Helvetica Neue"/>
+                <a:ea typeface="Helvetica Neue"/>
+                <a:cs typeface="Helvetica Neue"/>
+                <a:sym typeface="Helvetica Neue"/>
+              </a:defRPr>
+            </a:lvl1pPr>
+            <a:lvl2pPr>
+              <a:defRPr b="1" sz="8000">
+                <a:latin typeface="Helvetica Neue"/>
+                <a:ea typeface="Helvetica Neue"/>
+                <a:cs typeface="Helvetica Neue"/>
+                <a:sym typeface="Helvetica Neue"/>
+              </a:defRPr>
+            </a:lvl2pPr>
+          </a:lstStyle>
           <a:p>
             <a:pPr/>
             <a:r>

</xml_diff>